<commit_message>
replaces with the correct pptx file
</commit_message>
<xml_diff>
--- a/thirdai_python_package_tests/neural_db/document_test_data/connector_docs/SharePoint/sample_nda.pptx
+++ b/thirdai_python_package_tests/neural_db/document_test_data/connector_docs/SharePoint/sample_nda.pptx
@@ -2,25 +2,26 @@
 <file path=ppt/presentation.xml><?xml version="1.0" encoding="utf-8"?>
 <p:presentation xmlns:a="http://schemas.openxmlformats.org/drawingml/2006/main" xmlns:r="http://schemas.openxmlformats.org/officeDocument/2006/relationships" xmlns:p="http://schemas.openxmlformats.org/presentationml/2006/main" saveSubsetFonts="1">
   <p:sldMasterIdLst>
-    <p:sldMasterId id="2147483660" r:id="rId1"/>
+    <p:sldMasterId id="2147483660" r:id="rId4"/>
   </p:sldMasterIdLst>
   <p:sldIdLst>
-    <p:sldId id="256" r:id="rId2"/>
-    <p:sldId id="257" r:id="rId3"/>
-    <p:sldId id="260" r:id="rId4"/>
-    <p:sldId id="261" r:id="rId5"/>
-    <p:sldId id="262" r:id="rId6"/>
-    <p:sldId id="263" r:id="rId7"/>
-    <p:sldId id="264" r:id="rId8"/>
-    <p:sldId id="265" r:id="rId9"/>
-    <p:sldId id="266" r:id="rId10"/>
-    <p:sldId id="267" r:id="rId11"/>
-    <p:sldId id="268" r:id="rId12"/>
-    <p:sldId id="269" r:id="rId13"/>
-    <p:sldId id="270" r:id="rId14"/>
-    <p:sldId id="271" r:id="rId15"/>
-    <p:sldId id="272" r:id="rId16"/>
-    <p:sldId id="273" r:id="rId17"/>
+    <p:sldId id="256" r:id="rId5"/>
+    <p:sldId id="257" r:id="rId6"/>
+    <p:sldId id="260" r:id="rId7"/>
+    <p:sldId id="261" r:id="rId8"/>
+    <p:sldId id="262" r:id="rId9"/>
+    <p:sldId id="263" r:id="rId10"/>
+    <p:sldId id="264" r:id="rId11"/>
+    <p:sldId id="265" r:id="rId12"/>
+    <p:sldId id="266" r:id="rId13"/>
+    <p:sldId id="267" r:id="rId14"/>
+    <p:sldId id="268" r:id="rId15"/>
+    <p:sldId id="269" r:id="rId16"/>
+    <p:sldId id="270" r:id="rId17"/>
+    <p:sldId id="271" r:id="rId18"/>
+    <p:sldId id="272" r:id="rId19"/>
+    <p:sldId id="273" r:id="rId20"/>
+    <p:sldId id="274" r:id="rId21"/>
   </p:sldIdLst>
   <p:sldSz cx="12192000" cy="6858000"/>
   <p:notesSz cx="6858000" cy="9144000"/>
@@ -130,6 +131,7 @@
 <file path=ppt/revisionInfo.xml><?xml version="1.0" encoding="utf-8"?>
 <p1510:revInfo xmlns:a="http://schemas.openxmlformats.org/drawingml/2006/main" xmlns:r="http://schemas.openxmlformats.org/officeDocument/2006/relationships" xmlns:p1510="http://schemas.microsoft.com/office/powerpoint/2015/10/main">
   <p1510:revLst>
+    <p1510:client id="{20E57A6C-84CE-C2FE-C5A1-8980EEACCD1D}" v="56" dt="2023-11-06T09:30:59.357"/>
     <p1510:client id="{40406D30-E932-45D6-81C4-5D81DEBEA0D6}" v="174" dt="2023-10-18T11:04:48.870"/>
   </p1510:revLst>
 </p1510:revInfo>
@@ -137,6 +139,38 @@
 
 <file path=ppt/changesInfos/changesInfo1.xml><?xml version="1.0" encoding="utf-8"?>
 <pc:chgInfo xmlns:a="http://schemas.openxmlformats.org/drawingml/2006/main" xmlns:r="http://schemas.openxmlformats.org/officeDocument/2006/relationships" xmlns:ac="http://schemas.microsoft.com/office/drawing/2013/main/command" xmlns:pc="http://schemas.microsoft.com/office/powerpoint/2013/main/command">
+  <pc:docChgLst>
+    <pc:chgData name="Gautam Sharma" userId="S::gautamsharma95.95@kgpian.iitkgp.ac.in::16923100-e160-4218-b67c-2844b519b0d6" providerId="AD" clId="Web-{20E57A6C-84CE-C2FE-C5A1-8980EEACCD1D}"/>
+    <pc:docChg chg="addSld modSld">
+      <pc:chgData name="Gautam Sharma" userId="S::gautamsharma95.95@kgpian.iitkgp.ac.in::16923100-e160-4218-b67c-2844b519b0d6" providerId="AD" clId="Web-{20E57A6C-84CE-C2FE-C5A1-8980EEACCD1D}" dt="2023-11-06T09:30:59.357" v="67" actId="20577"/>
+      <pc:docMkLst>
+        <pc:docMk/>
+      </pc:docMkLst>
+      <pc:sldChg chg="delSp modSp new">
+        <pc:chgData name="Gautam Sharma" userId="S::gautamsharma95.95@kgpian.iitkgp.ac.in::16923100-e160-4218-b67c-2844b519b0d6" providerId="AD" clId="Web-{20E57A6C-84CE-C2FE-C5A1-8980EEACCD1D}" dt="2023-11-06T09:30:59.357" v="67" actId="20577"/>
+        <pc:sldMkLst>
+          <pc:docMk/>
+          <pc:sldMk cId="3213505610" sldId="274"/>
+        </pc:sldMkLst>
+        <pc:spChg chg="del">
+          <ac:chgData name="Gautam Sharma" userId="S::gautamsharma95.95@kgpian.iitkgp.ac.in::16923100-e160-4218-b67c-2844b519b0d6" providerId="AD" clId="Web-{20E57A6C-84CE-C2FE-C5A1-8980EEACCD1D}" dt="2023-11-06T09:28:16.698" v="4"/>
+          <ac:spMkLst>
+            <pc:docMk/>
+            <pc:sldMk cId="3213505610" sldId="274"/>
+            <ac:spMk id="2" creationId="{EEC9256F-03F4-498B-8445-4A59431579EE}"/>
+          </ac:spMkLst>
+        </pc:spChg>
+        <pc:spChg chg="mod">
+          <ac:chgData name="Gautam Sharma" userId="S::gautamsharma95.95@kgpian.iitkgp.ac.in::16923100-e160-4218-b67c-2844b519b0d6" providerId="AD" clId="Web-{20E57A6C-84CE-C2FE-C5A1-8980EEACCD1D}" dt="2023-11-06T09:30:59.357" v="67" actId="20577"/>
+          <ac:spMkLst>
+            <pc:docMk/>
+            <pc:sldMk cId="3213505610" sldId="274"/>
+            <ac:spMk id="3" creationId="{C3A4A9A2-BAEC-4AF1-E071-4B3D80F52EC4}"/>
+          </ac:spMkLst>
+        </pc:spChg>
+      </pc:sldChg>
+    </pc:docChg>
+  </pc:docChgLst>
   <pc:docChgLst>
     <pc:chgData name="Gautam Sharma" userId="S::gautamsharma95.95@kgpian.iitkgp.ac.in::16923100-e160-4218-b67c-2844b519b0d6" providerId="AD" clId="Web-{40406D30-E932-45D6-81C4-5D81DEBEA0D6}"/>
     <pc:docChg chg="addSld delSld modSld">
@@ -724,7 +758,7 @@
           <a:p>
             <a:fld id="{846CE7D5-CF57-46EF-B807-FDD0502418D4}" type="datetimeFigureOut">
               <a:rPr lang="en-GB" smtClean="0"/>
-              <a:t>18/10/2023</a:t>
+              <a:t>06/11/2023</a:t>
             </a:fld>
             <a:endParaRPr lang="en-GB"/>
           </a:p>
@@ -894,7 +928,7 @@
           <a:p>
             <a:fld id="{846CE7D5-CF57-46EF-B807-FDD0502418D4}" type="datetimeFigureOut">
               <a:rPr lang="en-GB" smtClean="0"/>
-              <a:t>18/10/2023</a:t>
+              <a:t>06/11/2023</a:t>
             </a:fld>
             <a:endParaRPr lang="en-GB"/>
           </a:p>
@@ -1074,7 +1108,7 @@
           <a:p>
             <a:fld id="{846CE7D5-CF57-46EF-B807-FDD0502418D4}" type="datetimeFigureOut">
               <a:rPr lang="en-GB" smtClean="0"/>
-              <a:t>18/10/2023</a:t>
+              <a:t>06/11/2023</a:t>
             </a:fld>
             <a:endParaRPr lang="en-GB"/>
           </a:p>
@@ -1244,7 +1278,7 @@
           <a:p>
             <a:fld id="{846CE7D5-CF57-46EF-B807-FDD0502418D4}" type="datetimeFigureOut">
               <a:rPr lang="en-GB" smtClean="0"/>
-              <a:t>18/10/2023</a:t>
+              <a:t>06/11/2023</a:t>
             </a:fld>
             <a:endParaRPr lang="en-GB"/>
           </a:p>
@@ -1490,7 +1524,7 @@
           <a:p>
             <a:fld id="{846CE7D5-CF57-46EF-B807-FDD0502418D4}" type="datetimeFigureOut">
               <a:rPr lang="en-GB" smtClean="0"/>
-              <a:t>18/10/2023</a:t>
+              <a:t>06/11/2023</a:t>
             </a:fld>
             <a:endParaRPr lang="en-GB"/>
           </a:p>
@@ -1722,7 +1756,7 @@
           <a:p>
             <a:fld id="{846CE7D5-CF57-46EF-B807-FDD0502418D4}" type="datetimeFigureOut">
               <a:rPr lang="en-GB" smtClean="0"/>
-              <a:t>18/10/2023</a:t>
+              <a:t>06/11/2023</a:t>
             </a:fld>
             <a:endParaRPr lang="en-GB"/>
           </a:p>
@@ -2089,7 +2123,7 @@
           <a:p>
             <a:fld id="{846CE7D5-CF57-46EF-B807-FDD0502418D4}" type="datetimeFigureOut">
               <a:rPr lang="en-GB" smtClean="0"/>
-              <a:t>18/10/2023</a:t>
+              <a:t>06/11/2023</a:t>
             </a:fld>
             <a:endParaRPr lang="en-GB"/>
           </a:p>
@@ -2207,7 +2241,7 @@
           <a:p>
             <a:fld id="{846CE7D5-CF57-46EF-B807-FDD0502418D4}" type="datetimeFigureOut">
               <a:rPr lang="en-GB" smtClean="0"/>
-              <a:t>18/10/2023</a:t>
+              <a:t>06/11/2023</a:t>
             </a:fld>
             <a:endParaRPr lang="en-GB"/>
           </a:p>
@@ -2302,7 +2336,7 @@
           <a:p>
             <a:fld id="{846CE7D5-CF57-46EF-B807-FDD0502418D4}" type="datetimeFigureOut">
               <a:rPr lang="en-GB" smtClean="0"/>
-              <a:t>18/10/2023</a:t>
+              <a:t>06/11/2023</a:t>
             </a:fld>
             <a:endParaRPr lang="en-GB"/>
           </a:p>
@@ -2579,7 +2613,7 @@
           <a:p>
             <a:fld id="{846CE7D5-CF57-46EF-B807-FDD0502418D4}" type="datetimeFigureOut">
               <a:rPr lang="en-GB" smtClean="0"/>
-              <a:t>18/10/2023</a:t>
+              <a:t>06/11/2023</a:t>
             </a:fld>
             <a:endParaRPr lang="en-GB"/>
           </a:p>
@@ -2836,7 +2870,7 @@
           <a:p>
             <a:fld id="{846CE7D5-CF57-46EF-B807-FDD0502418D4}" type="datetimeFigureOut">
               <a:rPr lang="en-GB" smtClean="0"/>
-              <a:t>18/10/2023</a:t>
+              <a:t>06/11/2023</a:t>
             </a:fld>
             <a:endParaRPr lang="en-GB"/>
           </a:p>
@@ -3049,7 +3083,7 @@
           <a:p>
             <a:fld id="{846CE7D5-CF57-46EF-B807-FDD0502418D4}" type="datetimeFigureOut">
               <a:rPr lang="en-GB" smtClean="0"/>
-              <a:t>18/10/2023</a:t>
+              <a:t>06/11/2023</a:t>
             </a:fld>
             <a:endParaRPr lang="en-GB"/>
           </a:p>
@@ -4621,6 +4655,243 @@
 </p:sld>
 </file>
 
+<file path=ppt/slides/slide17.xml><?xml version="1.0" encoding="utf-8"?>
+<p:sld xmlns:a="http://schemas.openxmlformats.org/drawingml/2006/main" xmlns:r="http://schemas.openxmlformats.org/officeDocument/2006/relationships" xmlns:p="http://schemas.openxmlformats.org/presentationml/2006/main">
+  <p:cSld>
+    <p:spTree>
+      <p:nvGrpSpPr>
+        <p:cNvPr id="1" name=""/>
+        <p:cNvGrpSpPr/>
+        <p:nvPr/>
+      </p:nvGrpSpPr>
+      <p:grpSpPr>
+        <a:xfrm>
+          <a:off x="0" y="0"/>
+          <a:ext cx="0" cy="0"/>
+          <a:chOff x="0" y="0"/>
+          <a:chExt cx="0" cy="0"/>
+        </a:xfrm>
+      </p:grpSpPr>
+      <p:sp>
+        <p:nvSpPr>
+          <p:cNvPr id="3" name="Content Placeholder 2">
+            <a:extLst>
+              <a:ext uri="{FF2B5EF4-FFF2-40B4-BE49-F238E27FC236}">
+                <a16:creationId xmlns:a16="http://schemas.microsoft.com/office/drawing/2014/main" id="{C3A4A9A2-BAEC-4AF1-E071-4B3D80F52EC4}"/>
+              </a:ext>
+            </a:extLst>
+          </p:cNvPr>
+          <p:cNvSpPr>
+            <a:spLocks noGrp="1"/>
+          </p:cNvSpPr>
+          <p:nvPr>
+            <p:ph idx="1"/>
+          </p:nvPr>
+        </p:nvSpPr>
+        <p:spPr>
+          <a:xfrm>
+            <a:off x="344510" y="430415"/>
+            <a:ext cx="11567374" cy="6208041"/>
+          </a:xfrm>
+        </p:spPr>
+        <p:txBody>
+          <a:bodyPr vert="horz" lIns="91440" tIns="45720" rIns="91440" bIns="45720" rtlCol="0" anchor="t">
+            <a:normAutofit/>
+          </a:bodyPr>
+          <a:lstStyle/>
+          <a:p>
+            <a:pPr marL="0" indent="0">
+              <a:buNone/>
+            </a:pPr>
+            <a:r>
+              <a:rPr lang="en-GB" sz="2400" b="1" dirty="0">
+                <a:ea typeface="+mn-lt"/>
+                <a:cs typeface="+mn-lt"/>
+              </a:rPr>
+              <a:t>IN WITNESS WHEREOF</a:t>
+            </a:r>
+            <a:r>
+              <a:rPr lang="en-GB" sz="2400" dirty="0">
+                <a:ea typeface="+mn-lt"/>
+                <a:cs typeface="+mn-lt"/>
+              </a:rPr>
+              <a:t>, this Agreement has been duly executed by the parties hereto as of the latest date set forth below:</a:t>
+            </a:r>
+            <a:endParaRPr lang="en-GB" sz="2400" dirty="0">
+              <a:cs typeface="Calibri" panose="020F0502020204030204"/>
+            </a:endParaRPr>
+          </a:p>
+          <a:p>
+            <a:pPr marL="0" indent="0">
+              <a:buNone/>
+            </a:pPr>
+            <a:endParaRPr lang="en-GB" sz="2400" dirty="0">
+              <a:cs typeface="Calibri" panose="020F0502020204030204"/>
+            </a:endParaRPr>
+          </a:p>
+          <a:p>
+            <a:pPr marL="0" indent="0">
+              <a:buNone/>
+            </a:pPr>
+            <a:r>
+              <a:rPr lang="en-GB" sz="2400" b="1" dirty="0">
+                <a:ea typeface="+mn-lt"/>
+                <a:cs typeface="+mn-lt"/>
+              </a:rPr>
+              <a:t>Acme Inc. </a:t>
+            </a:r>
+            <a:r>
+              <a:rPr lang="en-GB" sz="2400" dirty="0">
+                <a:ea typeface="+mn-lt"/>
+                <a:cs typeface="+mn-lt"/>
+              </a:rPr>
+              <a:t>By:</a:t>
+            </a:r>
+            <a:endParaRPr lang="en-GB" sz="2400">
+              <a:cs typeface="Calibri"/>
+            </a:endParaRPr>
+          </a:p>
+          <a:p>
+            <a:pPr marL="0" indent="0">
+              <a:buNone/>
+            </a:pPr>
+            <a:r>
+              <a:rPr lang="en-GB" sz="2400" dirty="0">
+                <a:ea typeface="+mn-lt"/>
+                <a:cs typeface="+mn-lt"/>
+              </a:rPr>
+              <a:t>Name: Bugs Bunny </a:t>
+            </a:r>
+            <a:endParaRPr lang="en-GB" sz="2400">
+              <a:ea typeface="+mn-lt"/>
+              <a:cs typeface="+mn-lt"/>
+            </a:endParaRPr>
+          </a:p>
+          <a:p>
+            <a:pPr marL="0" indent="0">
+              <a:buNone/>
+            </a:pPr>
+            <a:r>
+              <a:rPr lang="en-GB" sz="2400">
+                <a:ea typeface="+mn-lt"/>
+                <a:cs typeface="+mn-lt"/>
+              </a:rPr>
+              <a:t>Title: CEO</a:t>
+            </a:r>
+            <a:endParaRPr lang="en-GB"/>
+          </a:p>
+          <a:p>
+            <a:pPr marL="0" indent="0">
+              <a:buNone/>
+            </a:pPr>
+            <a:r>
+              <a:rPr lang="en-GB" sz="2400">
+                <a:ea typeface="+mn-lt"/>
+                <a:cs typeface="+mn-lt"/>
+              </a:rPr>
+              <a:t>Date: May 5, 2023 </a:t>
+            </a:r>
+            <a:endParaRPr lang="en-GB" sz="2400">
+              <a:cs typeface="Calibri"/>
+            </a:endParaRPr>
+          </a:p>
+          <a:p>
+            <a:pPr marL="0" indent="0">
+              <a:buNone/>
+            </a:pPr>
+            <a:endParaRPr lang="en-US" sz="2400"/>
+          </a:p>
+          <a:p>
+            <a:pPr marL="0" indent="0">
+              <a:buNone/>
+            </a:pPr>
+            <a:r>
+              <a:rPr lang="en-GB" sz="2400" b="1" err="1">
+                <a:ea typeface="+mn-lt"/>
+                <a:cs typeface="+mn-lt"/>
+              </a:rPr>
+              <a:t>StarWars</a:t>
+            </a:r>
+            <a:r>
+              <a:rPr lang="en-GB" sz="2400" b="1" dirty="0">
+                <a:ea typeface="+mn-lt"/>
+                <a:cs typeface="+mn-lt"/>
+              </a:rPr>
+              <a:t> Inc. </a:t>
+            </a:r>
+            <a:r>
+              <a:rPr lang="en-GB" sz="2400" dirty="0">
+                <a:ea typeface="+mn-lt"/>
+                <a:cs typeface="+mn-lt"/>
+              </a:rPr>
+              <a:t>By:</a:t>
+            </a:r>
+            <a:br>
+              <a:rPr lang="en-US" sz="2400" b="1" dirty="0"/>
+            </a:br>
+            <a:r>
+              <a:rPr lang="en-GB" sz="2400" dirty="0">
+                <a:ea typeface="+mn-lt"/>
+                <a:cs typeface="+mn-lt"/>
+              </a:rPr>
+              <a:t>Name: Luke Skywalker</a:t>
+            </a:r>
+            <a:endParaRPr lang="en-US" sz="2400">
+              <a:ea typeface="+mn-lt"/>
+              <a:cs typeface="+mn-lt"/>
+            </a:endParaRPr>
+          </a:p>
+          <a:p>
+            <a:pPr>
+              <a:buNone/>
+            </a:pPr>
+            <a:r>
+              <a:rPr lang="en-GB" sz="2400">
+                <a:ea typeface="+mn-lt"/>
+                <a:cs typeface="+mn-lt"/>
+              </a:rPr>
+              <a:t>Title: CEO</a:t>
+            </a:r>
+            <a:endParaRPr lang="en-US" sz="2400">
+              <a:ea typeface="+mn-lt"/>
+              <a:cs typeface="+mn-lt"/>
+            </a:endParaRPr>
+          </a:p>
+          <a:p>
+            <a:pPr marL="0" indent="0">
+              <a:buNone/>
+            </a:pPr>
+            <a:r>
+              <a:rPr lang="en-GB" sz="2400" dirty="0">
+                <a:ea typeface="+mn-lt"/>
+                <a:cs typeface="+mn-lt"/>
+              </a:rPr>
+              <a:t>Date: May 7, 2023</a:t>
+            </a:r>
+            <a:endParaRPr lang="en-GB" sz="2400">
+              <a:cs typeface="Calibri"/>
+            </a:endParaRPr>
+          </a:p>
+          <a:p>
+            <a:endParaRPr lang="en-GB" sz="1400" dirty="0">
+              <a:cs typeface="Calibri"/>
+            </a:endParaRPr>
+          </a:p>
+        </p:txBody>
+      </p:sp>
+    </p:spTree>
+    <p:extLst>
+      <p:ext uri="{BB962C8B-B14F-4D97-AF65-F5344CB8AC3E}">
+        <p14:creationId xmlns:p14="http://schemas.microsoft.com/office/powerpoint/2010/main" val="3213505610"/>
+      </p:ext>
+    </p:extLst>
+  </p:cSld>
+  <p:clrMapOvr>
+    <a:masterClrMapping/>
+  </p:clrMapOvr>
+</p:sld>
+</file>
+
 <file path=ppt/slides/slide2.xml><?xml version="1.0" encoding="utf-8"?>
 <p:sld xmlns:a="http://schemas.openxmlformats.org/drawingml/2006/main" xmlns:r="http://schemas.openxmlformats.org/officeDocument/2006/relationships" xmlns:p="http://schemas.openxmlformats.org/presentationml/2006/main">
   <p:cSld>
@@ -6202,6 +6473,15 @@
 </file>
 
 <file path=customXml/item1.xml><?xml version="1.0" encoding="utf-8"?>
+<?mso-contentType ?>
+<FormTemplates xmlns="http://schemas.microsoft.com/sharepoint/v3/contenttype/forms">
+  <Display>DocumentLibraryForm</Display>
+  <Edit>DocumentLibraryForm</Edit>
+  <New>DocumentLibraryForm</New>
+</FormTemplates>
+</file>
+
+<file path=customXml/item2.xml><?xml version="1.0" encoding="utf-8"?>
 <ct:contentTypeSchema xmlns:ct="http://schemas.microsoft.com/office/2006/metadata/contentType" xmlns:ma="http://schemas.microsoft.com/office/2006/metadata/properties/metaAttributes" ct:_="" ma:_="" ma:contentTypeName="Document" ma:contentTypeID="0x0101001D7F19C4D0FCDC4B9BE6583CC27C5028" ma:contentTypeVersion="5" ma:contentTypeDescription="Create a new document." ma:contentTypeScope="" ma:versionID="af34dd31b193ce090f81408a7db966df">
   <xsd:schema xmlns:xsd="http://www.w3.org/2001/XMLSchema" xmlns:xs="http://www.w3.org/2001/XMLSchema" xmlns:p="http://schemas.microsoft.com/office/2006/metadata/properties" xmlns:ns2="3374daa3-32b6-4006-987b-1a1a145ab55c" xmlns:ns3="c7b17f3f-bac5-4667-b844-bb0e49eeb697" targetNamespace="http://schemas.microsoft.com/office/2006/metadata/properties" ma:root="true" ma:fieldsID="29b4876c4be358ed88fb568b7c3adc5f" ns2:_="" ns3:_="">
     <xsd:import namespace="3374daa3-32b6-4006-987b-1a1a145ab55c"/>
@@ -6372,15 +6652,6 @@
 </ct:contentTypeSchema>
 </file>
 
-<file path=customXml/item2.xml><?xml version="1.0" encoding="utf-8"?>
-<?mso-contentType ?>
-<FormTemplates xmlns="http://schemas.microsoft.com/sharepoint/v3/contenttype/forms">
-  <Display>DocumentLibraryForm</Display>
-  <Edit>DocumentLibraryForm</Edit>
-  <New>DocumentLibraryForm</New>
-</FormTemplates>
-</file>
-
 <file path=customXml/item3.xml><?xml version="1.0" encoding="utf-8"?>
 <p:properties xmlns:p="http://schemas.microsoft.com/office/2006/metadata/properties" xmlns:xsi="http://www.w3.org/2001/XMLSchema-instance" xmlns:pc="http://schemas.microsoft.com/office/infopath/2007/PartnerControls">
   <documentManagement/>
@@ -6388,13 +6659,37 @@
 </file>
 
 <file path=customXml/itemProps1.xml><?xml version="1.0" encoding="utf-8"?>
-<ds:datastoreItem xmlns:ds="http://schemas.openxmlformats.org/officeDocument/2006/customXml" ds:itemID="{E18D46F7-522D-4C97-8D62-64BA2B3358C3}"/>
+<ds:datastoreItem xmlns:ds="http://schemas.openxmlformats.org/officeDocument/2006/customXml" ds:itemID="{03A7B2DE-D8E5-4DF1-9586-12839260C99E}">
+  <ds:schemaRefs>
+    <ds:schemaRef ds:uri="http://schemas.microsoft.com/sharepoint/v3/contenttype/forms"/>
+  </ds:schemaRefs>
+</ds:datastoreItem>
 </file>
 
 <file path=customXml/itemProps2.xml><?xml version="1.0" encoding="utf-8"?>
-<ds:datastoreItem xmlns:ds="http://schemas.openxmlformats.org/officeDocument/2006/customXml" ds:itemID="{03A7B2DE-D8E5-4DF1-9586-12839260C99E}"/>
+<ds:datastoreItem xmlns:ds="http://schemas.openxmlformats.org/officeDocument/2006/customXml" ds:itemID="{E18D46F7-522D-4C97-8D62-64BA2B3358C3}">
+  <ds:schemaRefs>
+    <ds:schemaRef ds:uri="http://schemas.microsoft.com/office/2006/metadata/contentType"/>
+    <ds:schemaRef ds:uri="http://schemas.microsoft.com/office/2006/metadata/properties/metaAttributes"/>
+    <ds:schemaRef ds:uri="http://www.w3.org/2001/XMLSchema"/>
+    <ds:schemaRef ds:uri="http://schemas.microsoft.com/office/2006/metadata/properties"/>
+    <ds:schemaRef ds:uri="3374daa3-32b6-4006-987b-1a1a145ab55c"/>
+    <ds:schemaRef ds:uri="c7b17f3f-bac5-4667-b844-bb0e49eeb697"/>
+    <ds:schemaRef ds:uri="http://schemas.microsoft.com/office/2006/documentManagement/types"/>
+    <ds:schemaRef ds:uri="http://schemas.microsoft.com/office/infopath/2007/PartnerControls"/>
+    <ds:schemaRef ds:uri="http://schemas.openxmlformats.org/package/2006/metadata/core-properties"/>
+    <ds:schemaRef ds:uri="http://purl.org/dc/elements/1.1/"/>
+    <ds:schemaRef ds:uri="http://purl.org/dc/terms/"/>
+    <ds:schemaRef ds:uri="http://schemas.microsoft.com/internal/obd"/>
+  </ds:schemaRefs>
+</ds:datastoreItem>
 </file>
 
 <file path=customXml/itemProps3.xml><?xml version="1.0" encoding="utf-8"?>
-<ds:datastoreItem xmlns:ds="http://schemas.openxmlformats.org/officeDocument/2006/customXml" ds:itemID="{D7F88D0A-D53D-49B0-9663-0E03E50F4602}"/>
+<ds:datastoreItem xmlns:ds="http://schemas.openxmlformats.org/officeDocument/2006/customXml" ds:itemID="{D7F88D0A-D53D-49B0-9663-0E03E50F4602}">
+  <ds:schemaRefs>
+    <ds:schemaRef ds:uri="http://schemas.microsoft.com/office/2006/metadata/properties"/>
+    <ds:schemaRef ds:uri="http://schemas.microsoft.com/office/infopath/2007/PartnerControls"/>
+  </ds:schemaRefs>
+</ds:datastoreItem>
 </file>
</xml_diff>

<commit_message>
replaces with the correct pptx file (#1837)
</commit_message>
<xml_diff>
--- a/thirdai_python_package_tests/neural_db/document_test_data/connector_docs/SharePoint/sample_nda.pptx
+++ b/thirdai_python_package_tests/neural_db/document_test_data/connector_docs/SharePoint/sample_nda.pptx
@@ -2,25 +2,26 @@
 <file path=ppt/presentation.xml><?xml version="1.0" encoding="utf-8"?>
 <p:presentation xmlns:a="http://schemas.openxmlformats.org/drawingml/2006/main" xmlns:r="http://schemas.openxmlformats.org/officeDocument/2006/relationships" xmlns:p="http://schemas.openxmlformats.org/presentationml/2006/main" saveSubsetFonts="1">
   <p:sldMasterIdLst>
-    <p:sldMasterId id="2147483660" r:id="rId1"/>
+    <p:sldMasterId id="2147483660" r:id="rId4"/>
   </p:sldMasterIdLst>
   <p:sldIdLst>
-    <p:sldId id="256" r:id="rId2"/>
-    <p:sldId id="257" r:id="rId3"/>
-    <p:sldId id="260" r:id="rId4"/>
-    <p:sldId id="261" r:id="rId5"/>
-    <p:sldId id="262" r:id="rId6"/>
-    <p:sldId id="263" r:id="rId7"/>
-    <p:sldId id="264" r:id="rId8"/>
-    <p:sldId id="265" r:id="rId9"/>
-    <p:sldId id="266" r:id="rId10"/>
-    <p:sldId id="267" r:id="rId11"/>
-    <p:sldId id="268" r:id="rId12"/>
-    <p:sldId id="269" r:id="rId13"/>
-    <p:sldId id="270" r:id="rId14"/>
-    <p:sldId id="271" r:id="rId15"/>
-    <p:sldId id="272" r:id="rId16"/>
-    <p:sldId id="273" r:id="rId17"/>
+    <p:sldId id="256" r:id="rId5"/>
+    <p:sldId id="257" r:id="rId6"/>
+    <p:sldId id="260" r:id="rId7"/>
+    <p:sldId id="261" r:id="rId8"/>
+    <p:sldId id="262" r:id="rId9"/>
+    <p:sldId id="263" r:id="rId10"/>
+    <p:sldId id="264" r:id="rId11"/>
+    <p:sldId id="265" r:id="rId12"/>
+    <p:sldId id="266" r:id="rId13"/>
+    <p:sldId id="267" r:id="rId14"/>
+    <p:sldId id="268" r:id="rId15"/>
+    <p:sldId id="269" r:id="rId16"/>
+    <p:sldId id="270" r:id="rId17"/>
+    <p:sldId id="271" r:id="rId18"/>
+    <p:sldId id="272" r:id="rId19"/>
+    <p:sldId id="273" r:id="rId20"/>
+    <p:sldId id="274" r:id="rId21"/>
   </p:sldIdLst>
   <p:sldSz cx="12192000" cy="6858000"/>
   <p:notesSz cx="6858000" cy="9144000"/>
@@ -130,6 +131,7 @@
 <file path=ppt/revisionInfo.xml><?xml version="1.0" encoding="utf-8"?>
 <p1510:revInfo xmlns:a="http://schemas.openxmlformats.org/drawingml/2006/main" xmlns:r="http://schemas.openxmlformats.org/officeDocument/2006/relationships" xmlns:p1510="http://schemas.microsoft.com/office/powerpoint/2015/10/main">
   <p1510:revLst>
+    <p1510:client id="{20E57A6C-84CE-C2FE-C5A1-8980EEACCD1D}" v="56" dt="2023-11-06T09:30:59.357"/>
     <p1510:client id="{40406D30-E932-45D6-81C4-5D81DEBEA0D6}" v="174" dt="2023-10-18T11:04:48.870"/>
   </p1510:revLst>
 </p1510:revInfo>
@@ -137,6 +139,38 @@
 
 <file path=ppt/changesInfos/changesInfo1.xml><?xml version="1.0" encoding="utf-8"?>
 <pc:chgInfo xmlns:a="http://schemas.openxmlformats.org/drawingml/2006/main" xmlns:r="http://schemas.openxmlformats.org/officeDocument/2006/relationships" xmlns:ac="http://schemas.microsoft.com/office/drawing/2013/main/command" xmlns:pc="http://schemas.microsoft.com/office/powerpoint/2013/main/command">
+  <pc:docChgLst>
+    <pc:chgData name="Gautam Sharma" userId="S::gautamsharma95.95@kgpian.iitkgp.ac.in::16923100-e160-4218-b67c-2844b519b0d6" providerId="AD" clId="Web-{20E57A6C-84CE-C2FE-C5A1-8980EEACCD1D}"/>
+    <pc:docChg chg="addSld modSld">
+      <pc:chgData name="Gautam Sharma" userId="S::gautamsharma95.95@kgpian.iitkgp.ac.in::16923100-e160-4218-b67c-2844b519b0d6" providerId="AD" clId="Web-{20E57A6C-84CE-C2FE-C5A1-8980EEACCD1D}" dt="2023-11-06T09:30:59.357" v="67" actId="20577"/>
+      <pc:docMkLst>
+        <pc:docMk/>
+      </pc:docMkLst>
+      <pc:sldChg chg="delSp modSp new">
+        <pc:chgData name="Gautam Sharma" userId="S::gautamsharma95.95@kgpian.iitkgp.ac.in::16923100-e160-4218-b67c-2844b519b0d6" providerId="AD" clId="Web-{20E57A6C-84CE-C2FE-C5A1-8980EEACCD1D}" dt="2023-11-06T09:30:59.357" v="67" actId="20577"/>
+        <pc:sldMkLst>
+          <pc:docMk/>
+          <pc:sldMk cId="3213505610" sldId="274"/>
+        </pc:sldMkLst>
+        <pc:spChg chg="del">
+          <ac:chgData name="Gautam Sharma" userId="S::gautamsharma95.95@kgpian.iitkgp.ac.in::16923100-e160-4218-b67c-2844b519b0d6" providerId="AD" clId="Web-{20E57A6C-84CE-C2FE-C5A1-8980EEACCD1D}" dt="2023-11-06T09:28:16.698" v="4"/>
+          <ac:spMkLst>
+            <pc:docMk/>
+            <pc:sldMk cId="3213505610" sldId="274"/>
+            <ac:spMk id="2" creationId="{EEC9256F-03F4-498B-8445-4A59431579EE}"/>
+          </ac:spMkLst>
+        </pc:spChg>
+        <pc:spChg chg="mod">
+          <ac:chgData name="Gautam Sharma" userId="S::gautamsharma95.95@kgpian.iitkgp.ac.in::16923100-e160-4218-b67c-2844b519b0d6" providerId="AD" clId="Web-{20E57A6C-84CE-C2FE-C5A1-8980EEACCD1D}" dt="2023-11-06T09:30:59.357" v="67" actId="20577"/>
+          <ac:spMkLst>
+            <pc:docMk/>
+            <pc:sldMk cId="3213505610" sldId="274"/>
+            <ac:spMk id="3" creationId="{C3A4A9A2-BAEC-4AF1-E071-4B3D80F52EC4}"/>
+          </ac:spMkLst>
+        </pc:spChg>
+      </pc:sldChg>
+    </pc:docChg>
+  </pc:docChgLst>
   <pc:docChgLst>
     <pc:chgData name="Gautam Sharma" userId="S::gautamsharma95.95@kgpian.iitkgp.ac.in::16923100-e160-4218-b67c-2844b519b0d6" providerId="AD" clId="Web-{40406D30-E932-45D6-81C4-5D81DEBEA0D6}"/>
     <pc:docChg chg="addSld delSld modSld">
@@ -724,7 +758,7 @@
           <a:p>
             <a:fld id="{846CE7D5-CF57-46EF-B807-FDD0502418D4}" type="datetimeFigureOut">
               <a:rPr lang="en-GB" smtClean="0"/>
-              <a:t>18/10/2023</a:t>
+              <a:t>06/11/2023</a:t>
             </a:fld>
             <a:endParaRPr lang="en-GB"/>
           </a:p>
@@ -894,7 +928,7 @@
           <a:p>
             <a:fld id="{846CE7D5-CF57-46EF-B807-FDD0502418D4}" type="datetimeFigureOut">
               <a:rPr lang="en-GB" smtClean="0"/>
-              <a:t>18/10/2023</a:t>
+              <a:t>06/11/2023</a:t>
             </a:fld>
             <a:endParaRPr lang="en-GB"/>
           </a:p>
@@ -1074,7 +1108,7 @@
           <a:p>
             <a:fld id="{846CE7D5-CF57-46EF-B807-FDD0502418D4}" type="datetimeFigureOut">
               <a:rPr lang="en-GB" smtClean="0"/>
-              <a:t>18/10/2023</a:t>
+              <a:t>06/11/2023</a:t>
             </a:fld>
             <a:endParaRPr lang="en-GB"/>
           </a:p>
@@ -1244,7 +1278,7 @@
           <a:p>
             <a:fld id="{846CE7D5-CF57-46EF-B807-FDD0502418D4}" type="datetimeFigureOut">
               <a:rPr lang="en-GB" smtClean="0"/>
-              <a:t>18/10/2023</a:t>
+              <a:t>06/11/2023</a:t>
             </a:fld>
             <a:endParaRPr lang="en-GB"/>
           </a:p>
@@ -1490,7 +1524,7 @@
           <a:p>
             <a:fld id="{846CE7D5-CF57-46EF-B807-FDD0502418D4}" type="datetimeFigureOut">
               <a:rPr lang="en-GB" smtClean="0"/>
-              <a:t>18/10/2023</a:t>
+              <a:t>06/11/2023</a:t>
             </a:fld>
             <a:endParaRPr lang="en-GB"/>
           </a:p>
@@ -1722,7 +1756,7 @@
           <a:p>
             <a:fld id="{846CE7D5-CF57-46EF-B807-FDD0502418D4}" type="datetimeFigureOut">
               <a:rPr lang="en-GB" smtClean="0"/>
-              <a:t>18/10/2023</a:t>
+              <a:t>06/11/2023</a:t>
             </a:fld>
             <a:endParaRPr lang="en-GB"/>
           </a:p>
@@ -2089,7 +2123,7 @@
           <a:p>
             <a:fld id="{846CE7D5-CF57-46EF-B807-FDD0502418D4}" type="datetimeFigureOut">
               <a:rPr lang="en-GB" smtClean="0"/>
-              <a:t>18/10/2023</a:t>
+              <a:t>06/11/2023</a:t>
             </a:fld>
             <a:endParaRPr lang="en-GB"/>
           </a:p>
@@ -2207,7 +2241,7 @@
           <a:p>
             <a:fld id="{846CE7D5-CF57-46EF-B807-FDD0502418D4}" type="datetimeFigureOut">
               <a:rPr lang="en-GB" smtClean="0"/>
-              <a:t>18/10/2023</a:t>
+              <a:t>06/11/2023</a:t>
             </a:fld>
             <a:endParaRPr lang="en-GB"/>
           </a:p>
@@ -2302,7 +2336,7 @@
           <a:p>
             <a:fld id="{846CE7D5-CF57-46EF-B807-FDD0502418D4}" type="datetimeFigureOut">
               <a:rPr lang="en-GB" smtClean="0"/>
-              <a:t>18/10/2023</a:t>
+              <a:t>06/11/2023</a:t>
             </a:fld>
             <a:endParaRPr lang="en-GB"/>
           </a:p>
@@ -2579,7 +2613,7 @@
           <a:p>
             <a:fld id="{846CE7D5-CF57-46EF-B807-FDD0502418D4}" type="datetimeFigureOut">
               <a:rPr lang="en-GB" smtClean="0"/>
-              <a:t>18/10/2023</a:t>
+              <a:t>06/11/2023</a:t>
             </a:fld>
             <a:endParaRPr lang="en-GB"/>
           </a:p>
@@ -2836,7 +2870,7 @@
           <a:p>
             <a:fld id="{846CE7D5-CF57-46EF-B807-FDD0502418D4}" type="datetimeFigureOut">
               <a:rPr lang="en-GB" smtClean="0"/>
-              <a:t>18/10/2023</a:t>
+              <a:t>06/11/2023</a:t>
             </a:fld>
             <a:endParaRPr lang="en-GB"/>
           </a:p>
@@ -3049,7 +3083,7 @@
           <a:p>
             <a:fld id="{846CE7D5-CF57-46EF-B807-FDD0502418D4}" type="datetimeFigureOut">
               <a:rPr lang="en-GB" smtClean="0"/>
-              <a:t>18/10/2023</a:t>
+              <a:t>06/11/2023</a:t>
             </a:fld>
             <a:endParaRPr lang="en-GB"/>
           </a:p>
@@ -4621,6 +4655,243 @@
 </p:sld>
 </file>
 
+<file path=ppt/slides/slide17.xml><?xml version="1.0" encoding="utf-8"?>
+<p:sld xmlns:a="http://schemas.openxmlformats.org/drawingml/2006/main" xmlns:r="http://schemas.openxmlformats.org/officeDocument/2006/relationships" xmlns:p="http://schemas.openxmlformats.org/presentationml/2006/main">
+  <p:cSld>
+    <p:spTree>
+      <p:nvGrpSpPr>
+        <p:cNvPr id="1" name=""/>
+        <p:cNvGrpSpPr/>
+        <p:nvPr/>
+      </p:nvGrpSpPr>
+      <p:grpSpPr>
+        <a:xfrm>
+          <a:off x="0" y="0"/>
+          <a:ext cx="0" cy="0"/>
+          <a:chOff x="0" y="0"/>
+          <a:chExt cx="0" cy="0"/>
+        </a:xfrm>
+      </p:grpSpPr>
+      <p:sp>
+        <p:nvSpPr>
+          <p:cNvPr id="3" name="Content Placeholder 2">
+            <a:extLst>
+              <a:ext uri="{FF2B5EF4-FFF2-40B4-BE49-F238E27FC236}">
+                <a16:creationId xmlns:a16="http://schemas.microsoft.com/office/drawing/2014/main" id="{C3A4A9A2-BAEC-4AF1-E071-4B3D80F52EC4}"/>
+              </a:ext>
+            </a:extLst>
+          </p:cNvPr>
+          <p:cNvSpPr>
+            <a:spLocks noGrp="1"/>
+          </p:cNvSpPr>
+          <p:nvPr>
+            <p:ph idx="1"/>
+          </p:nvPr>
+        </p:nvSpPr>
+        <p:spPr>
+          <a:xfrm>
+            <a:off x="344510" y="430415"/>
+            <a:ext cx="11567374" cy="6208041"/>
+          </a:xfrm>
+        </p:spPr>
+        <p:txBody>
+          <a:bodyPr vert="horz" lIns="91440" tIns="45720" rIns="91440" bIns="45720" rtlCol="0" anchor="t">
+            <a:normAutofit/>
+          </a:bodyPr>
+          <a:lstStyle/>
+          <a:p>
+            <a:pPr marL="0" indent="0">
+              <a:buNone/>
+            </a:pPr>
+            <a:r>
+              <a:rPr lang="en-GB" sz="2400" b="1" dirty="0">
+                <a:ea typeface="+mn-lt"/>
+                <a:cs typeface="+mn-lt"/>
+              </a:rPr>
+              <a:t>IN WITNESS WHEREOF</a:t>
+            </a:r>
+            <a:r>
+              <a:rPr lang="en-GB" sz="2400" dirty="0">
+                <a:ea typeface="+mn-lt"/>
+                <a:cs typeface="+mn-lt"/>
+              </a:rPr>
+              <a:t>, this Agreement has been duly executed by the parties hereto as of the latest date set forth below:</a:t>
+            </a:r>
+            <a:endParaRPr lang="en-GB" sz="2400" dirty="0">
+              <a:cs typeface="Calibri" panose="020F0502020204030204"/>
+            </a:endParaRPr>
+          </a:p>
+          <a:p>
+            <a:pPr marL="0" indent="0">
+              <a:buNone/>
+            </a:pPr>
+            <a:endParaRPr lang="en-GB" sz="2400" dirty="0">
+              <a:cs typeface="Calibri" panose="020F0502020204030204"/>
+            </a:endParaRPr>
+          </a:p>
+          <a:p>
+            <a:pPr marL="0" indent="0">
+              <a:buNone/>
+            </a:pPr>
+            <a:r>
+              <a:rPr lang="en-GB" sz="2400" b="1" dirty="0">
+                <a:ea typeface="+mn-lt"/>
+                <a:cs typeface="+mn-lt"/>
+              </a:rPr>
+              <a:t>Acme Inc. </a:t>
+            </a:r>
+            <a:r>
+              <a:rPr lang="en-GB" sz="2400" dirty="0">
+                <a:ea typeface="+mn-lt"/>
+                <a:cs typeface="+mn-lt"/>
+              </a:rPr>
+              <a:t>By:</a:t>
+            </a:r>
+            <a:endParaRPr lang="en-GB" sz="2400">
+              <a:cs typeface="Calibri"/>
+            </a:endParaRPr>
+          </a:p>
+          <a:p>
+            <a:pPr marL="0" indent="0">
+              <a:buNone/>
+            </a:pPr>
+            <a:r>
+              <a:rPr lang="en-GB" sz="2400" dirty="0">
+                <a:ea typeface="+mn-lt"/>
+                <a:cs typeface="+mn-lt"/>
+              </a:rPr>
+              <a:t>Name: Bugs Bunny </a:t>
+            </a:r>
+            <a:endParaRPr lang="en-GB" sz="2400">
+              <a:ea typeface="+mn-lt"/>
+              <a:cs typeface="+mn-lt"/>
+            </a:endParaRPr>
+          </a:p>
+          <a:p>
+            <a:pPr marL="0" indent="0">
+              <a:buNone/>
+            </a:pPr>
+            <a:r>
+              <a:rPr lang="en-GB" sz="2400">
+                <a:ea typeface="+mn-lt"/>
+                <a:cs typeface="+mn-lt"/>
+              </a:rPr>
+              <a:t>Title: CEO</a:t>
+            </a:r>
+            <a:endParaRPr lang="en-GB"/>
+          </a:p>
+          <a:p>
+            <a:pPr marL="0" indent="0">
+              <a:buNone/>
+            </a:pPr>
+            <a:r>
+              <a:rPr lang="en-GB" sz="2400">
+                <a:ea typeface="+mn-lt"/>
+                <a:cs typeface="+mn-lt"/>
+              </a:rPr>
+              <a:t>Date: May 5, 2023 </a:t>
+            </a:r>
+            <a:endParaRPr lang="en-GB" sz="2400">
+              <a:cs typeface="Calibri"/>
+            </a:endParaRPr>
+          </a:p>
+          <a:p>
+            <a:pPr marL="0" indent="0">
+              <a:buNone/>
+            </a:pPr>
+            <a:endParaRPr lang="en-US" sz="2400"/>
+          </a:p>
+          <a:p>
+            <a:pPr marL="0" indent="0">
+              <a:buNone/>
+            </a:pPr>
+            <a:r>
+              <a:rPr lang="en-GB" sz="2400" b="1" err="1">
+                <a:ea typeface="+mn-lt"/>
+                <a:cs typeface="+mn-lt"/>
+              </a:rPr>
+              <a:t>StarWars</a:t>
+            </a:r>
+            <a:r>
+              <a:rPr lang="en-GB" sz="2400" b="1" dirty="0">
+                <a:ea typeface="+mn-lt"/>
+                <a:cs typeface="+mn-lt"/>
+              </a:rPr>
+              <a:t> Inc. </a:t>
+            </a:r>
+            <a:r>
+              <a:rPr lang="en-GB" sz="2400" dirty="0">
+                <a:ea typeface="+mn-lt"/>
+                <a:cs typeface="+mn-lt"/>
+              </a:rPr>
+              <a:t>By:</a:t>
+            </a:r>
+            <a:br>
+              <a:rPr lang="en-US" sz="2400" b="1" dirty="0"/>
+            </a:br>
+            <a:r>
+              <a:rPr lang="en-GB" sz="2400" dirty="0">
+                <a:ea typeface="+mn-lt"/>
+                <a:cs typeface="+mn-lt"/>
+              </a:rPr>
+              <a:t>Name: Luke Skywalker</a:t>
+            </a:r>
+            <a:endParaRPr lang="en-US" sz="2400">
+              <a:ea typeface="+mn-lt"/>
+              <a:cs typeface="+mn-lt"/>
+            </a:endParaRPr>
+          </a:p>
+          <a:p>
+            <a:pPr>
+              <a:buNone/>
+            </a:pPr>
+            <a:r>
+              <a:rPr lang="en-GB" sz="2400">
+                <a:ea typeface="+mn-lt"/>
+                <a:cs typeface="+mn-lt"/>
+              </a:rPr>
+              <a:t>Title: CEO</a:t>
+            </a:r>
+            <a:endParaRPr lang="en-US" sz="2400">
+              <a:ea typeface="+mn-lt"/>
+              <a:cs typeface="+mn-lt"/>
+            </a:endParaRPr>
+          </a:p>
+          <a:p>
+            <a:pPr marL="0" indent="0">
+              <a:buNone/>
+            </a:pPr>
+            <a:r>
+              <a:rPr lang="en-GB" sz="2400" dirty="0">
+                <a:ea typeface="+mn-lt"/>
+                <a:cs typeface="+mn-lt"/>
+              </a:rPr>
+              <a:t>Date: May 7, 2023</a:t>
+            </a:r>
+            <a:endParaRPr lang="en-GB" sz="2400">
+              <a:cs typeface="Calibri"/>
+            </a:endParaRPr>
+          </a:p>
+          <a:p>
+            <a:endParaRPr lang="en-GB" sz="1400" dirty="0">
+              <a:cs typeface="Calibri"/>
+            </a:endParaRPr>
+          </a:p>
+        </p:txBody>
+      </p:sp>
+    </p:spTree>
+    <p:extLst>
+      <p:ext uri="{BB962C8B-B14F-4D97-AF65-F5344CB8AC3E}">
+        <p14:creationId xmlns:p14="http://schemas.microsoft.com/office/powerpoint/2010/main" val="3213505610"/>
+      </p:ext>
+    </p:extLst>
+  </p:cSld>
+  <p:clrMapOvr>
+    <a:masterClrMapping/>
+  </p:clrMapOvr>
+</p:sld>
+</file>
+
 <file path=ppt/slides/slide2.xml><?xml version="1.0" encoding="utf-8"?>
 <p:sld xmlns:a="http://schemas.openxmlformats.org/drawingml/2006/main" xmlns:r="http://schemas.openxmlformats.org/officeDocument/2006/relationships" xmlns:p="http://schemas.openxmlformats.org/presentationml/2006/main">
   <p:cSld>
@@ -6202,6 +6473,15 @@
 </file>
 
 <file path=customXml/item1.xml><?xml version="1.0" encoding="utf-8"?>
+<?mso-contentType ?>
+<FormTemplates xmlns="http://schemas.microsoft.com/sharepoint/v3/contenttype/forms">
+  <Display>DocumentLibraryForm</Display>
+  <Edit>DocumentLibraryForm</Edit>
+  <New>DocumentLibraryForm</New>
+</FormTemplates>
+</file>
+
+<file path=customXml/item2.xml><?xml version="1.0" encoding="utf-8"?>
 <ct:contentTypeSchema xmlns:ct="http://schemas.microsoft.com/office/2006/metadata/contentType" xmlns:ma="http://schemas.microsoft.com/office/2006/metadata/properties/metaAttributes" ct:_="" ma:_="" ma:contentTypeName="Document" ma:contentTypeID="0x0101001D7F19C4D0FCDC4B9BE6583CC27C5028" ma:contentTypeVersion="5" ma:contentTypeDescription="Create a new document." ma:contentTypeScope="" ma:versionID="af34dd31b193ce090f81408a7db966df">
   <xsd:schema xmlns:xsd="http://www.w3.org/2001/XMLSchema" xmlns:xs="http://www.w3.org/2001/XMLSchema" xmlns:p="http://schemas.microsoft.com/office/2006/metadata/properties" xmlns:ns2="3374daa3-32b6-4006-987b-1a1a145ab55c" xmlns:ns3="c7b17f3f-bac5-4667-b844-bb0e49eeb697" targetNamespace="http://schemas.microsoft.com/office/2006/metadata/properties" ma:root="true" ma:fieldsID="29b4876c4be358ed88fb568b7c3adc5f" ns2:_="" ns3:_="">
     <xsd:import namespace="3374daa3-32b6-4006-987b-1a1a145ab55c"/>
@@ -6372,15 +6652,6 @@
 </ct:contentTypeSchema>
 </file>
 
-<file path=customXml/item2.xml><?xml version="1.0" encoding="utf-8"?>
-<?mso-contentType ?>
-<FormTemplates xmlns="http://schemas.microsoft.com/sharepoint/v3/contenttype/forms">
-  <Display>DocumentLibraryForm</Display>
-  <Edit>DocumentLibraryForm</Edit>
-  <New>DocumentLibraryForm</New>
-</FormTemplates>
-</file>
-
 <file path=customXml/item3.xml><?xml version="1.0" encoding="utf-8"?>
 <p:properties xmlns:p="http://schemas.microsoft.com/office/2006/metadata/properties" xmlns:xsi="http://www.w3.org/2001/XMLSchema-instance" xmlns:pc="http://schemas.microsoft.com/office/infopath/2007/PartnerControls">
   <documentManagement/>
@@ -6388,13 +6659,37 @@
 </file>
 
 <file path=customXml/itemProps1.xml><?xml version="1.0" encoding="utf-8"?>
-<ds:datastoreItem xmlns:ds="http://schemas.openxmlformats.org/officeDocument/2006/customXml" ds:itemID="{E18D46F7-522D-4C97-8D62-64BA2B3358C3}"/>
+<ds:datastoreItem xmlns:ds="http://schemas.openxmlformats.org/officeDocument/2006/customXml" ds:itemID="{03A7B2DE-D8E5-4DF1-9586-12839260C99E}">
+  <ds:schemaRefs>
+    <ds:schemaRef ds:uri="http://schemas.microsoft.com/sharepoint/v3/contenttype/forms"/>
+  </ds:schemaRefs>
+</ds:datastoreItem>
 </file>
 
 <file path=customXml/itemProps2.xml><?xml version="1.0" encoding="utf-8"?>
-<ds:datastoreItem xmlns:ds="http://schemas.openxmlformats.org/officeDocument/2006/customXml" ds:itemID="{03A7B2DE-D8E5-4DF1-9586-12839260C99E}"/>
+<ds:datastoreItem xmlns:ds="http://schemas.openxmlformats.org/officeDocument/2006/customXml" ds:itemID="{E18D46F7-522D-4C97-8D62-64BA2B3358C3}">
+  <ds:schemaRefs>
+    <ds:schemaRef ds:uri="http://schemas.microsoft.com/office/2006/metadata/contentType"/>
+    <ds:schemaRef ds:uri="http://schemas.microsoft.com/office/2006/metadata/properties/metaAttributes"/>
+    <ds:schemaRef ds:uri="http://www.w3.org/2001/XMLSchema"/>
+    <ds:schemaRef ds:uri="http://schemas.microsoft.com/office/2006/metadata/properties"/>
+    <ds:schemaRef ds:uri="3374daa3-32b6-4006-987b-1a1a145ab55c"/>
+    <ds:schemaRef ds:uri="c7b17f3f-bac5-4667-b844-bb0e49eeb697"/>
+    <ds:schemaRef ds:uri="http://schemas.microsoft.com/office/2006/documentManagement/types"/>
+    <ds:schemaRef ds:uri="http://schemas.microsoft.com/office/infopath/2007/PartnerControls"/>
+    <ds:schemaRef ds:uri="http://schemas.openxmlformats.org/package/2006/metadata/core-properties"/>
+    <ds:schemaRef ds:uri="http://purl.org/dc/elements/1.1/"/>
+    <ds:schemaRef ds:uri="http://purl.org/dc/terms/"/>
+    <ds:schemaRef ds:uri="http://schemas.microsoft.com/internal/obd"/>
+  </ds:schemaRefs>
+</ds:datastoreItem>
 </file>
 
 <file path=customXml/itemProps3.xml><?xml version="1.0" encoding="utf-8"?>
-<ds:datastoreItem xmlns:ds="http://schemas.openxmlformats.org/officeDocument/2006/customXml" ds:itemID="{D7F88D0A-D53D-49B0-9663-0E03E50F4602}"/>
+<ds:datastoreItem xmlns:ds="http://schemas.openxmlformats.org/officeDocument/2006/customXml" ds:itemID="{D7F88D0A-D53D-49B0-9663-0E03E50F4602}">
+  <ds:schemaRefs>
+    <ds:schemaRef ds:uri="http://schemas.microsoft.com/office/2006/metadata/properties"/>
+    <ds:schemaRef ds:uri="http://schemas.microsoft.com/office/infopath/2007/PartnerControls"/>
+  </ds:schemaRefs>
+</ds:datastoreItem>
 </file>
</xml_diff>